<commit_message>
update for presentation files
</commit_message>
<xml_diff>
--- a/Project-Tableau/Presentation Canadian Housing.pptx
+++ b/Project-Tableau/Presentation Canadian Housing.pptx
@@ -5,17 +5,22 @@
     <p:sldMasterId id="2147483648" r:id="rId1"/>
   </p:sldMasterIdLst>
   <p:sldIdLst>
-    <p:sldId id="256" r:id="rId19"/>
-    <p:sldId id="257" r:id="rId20"/>
-    <p:sldId id="258" r:id="rId21"/>
-    <p:sldId id="259" r:id="rId22"/>
-    <p:sldId id="260" r:id="rId23"/>
-    <p:sldId id="261" r:id="rId24"/>
-    <p:sldId id="262" r:id="rId25"/>
-    <p:sldId id="263" r:id="rId26"/>
-    <p:sldId id="264" r:id="rId27"/>
-    <p:sldId id="265" r:id="rId28"/>
-    <p:sldId id="266" r:id="rId29"/>
+    <p:sldId id="256" r:id="rId20"/>
+    <p:sldId id="257" r:id="rId21"/>
+    <p:sldId id="258" r:id="rId22"/>
+    <p:sldId id="259" r:id="rId23"/>
+    <p:sldId id="260" r:id="rId24"/>
+    <p:sldId id="261" r:id="rId25"/>
+    <p:sldId id="262" r:id="rId26"/>
+    <p:sldId id="263" r:id="rId27"/>
+    <p:sldId id="264" r:id="rId28"/>
+    <p:sldId id="265" r:id="rId29"/>
+    <p:sldId id="266" r:id="rId30"/>
+    <p:sldId id="267" r:id="rId31"/>
+    <p:sldId id="268" r:id="rId32"/>
+    <p:sldId id="269" r:id="rId33"/>
+    <p:sldId id="270" r:id="rId34"/>
+    <p:sldId id="271" r:id="rId35"/>
   </p:sldIdLst>
   <p:sldSz cx="18288000" cy="10287000"/>
   <p:notesSz cx="6858000" cy="9144000"/>
@@ -45,32 +50,36 @@
       <p:regular r:id="rId11"/>
     </p:embeddedFont>
     <p:embeddedFont>
-      <p:font typeface="Montserrat" charset="1" panose="00000500000000000000"/>
+      <p:font typeface="Bukhari Script" charset="1" panose="00000500000000000000"/>
       <p:regular r:id="rId12"/>
     </p:embeddedFont>
     <p:embeddedFont>
-      <p:font typeface="Montserrat Bold" charset="1" panose="00000600000000000000"/>
+      <p:font typeface="Montserrat" charset="1" panose="00000500000000000000"/>
       <p:regular r:id="rId13"/>
     </p:embeddedFont>
     <p:embeddedFont>
-      <p:font typeface="Montserrat Italics" charset="1" panose="00000500000000000000"/>
+      <p:font typeface="Montserrat Bold" charset="1" panose="00000600000000000000"/>
       <p:regular r:id="rId14"/>
     </p:embeddedFont>
     <p:embeddedFont>
-      <p:font typeface="Montserrat Bold Italics" charset="1" panose="00000600000000000000"/>
+      <p:font typeface="Montserrat Italics" charset="1" panose="00000500000000000000"/>
       <p:regular r:id="rId15"/>
     </p:embeddedFont>
     <p:embeddedFont>
-      <p:font typeface="Cocomat Pro Heavy" charset="1" panose="00000A00000000000000"/>
+      <p:font typeface="Montserrat Bold Italics" charset="1" panose="00000600000000000000"/>
       <p:regular r:id="rId16"/>
     </p:embeddedFont>
     <p:embeddedFont>
-      <p:font typeface="Cocomat Pro Heavy Italics" charset="1" panose="00000A00000000000000"/>
+      <p:font typeface="Cocomat Pro Heavy" charset="1" panose="00000A00000000000000"/>
       <p:regular r:id="rId17"/>
     </p:embeddedFont>
     <p:embeddedFont>
+      <p:font typeface="Cocomat Pro Heavy Italics" charset="1" panose="00000A00000000000000"/>
+      <p:regular r:id="rId18"/>
+    </p:embeddedFont>
+    <p:embeddedFont>
       <p:font typeface="Michegar" charset="1" panose="00000000000000000000"/>
-      <p:regular r:id="rId18"/>
+      <p:regular r:id="rId19"/>
     </p:embeddedFont>
   </p:embeddedFontLst>
   <p:defaultTextStyle>
@@ -3427,7 +3436,7 @@
                 </a:solidFill>
                 <a:latin typeface="Montserrat Bold Italics"/>
               </a:rPr>
-              <a:t>STATISTICS REVIEW</a:t>
+              <a:t>VISUAL ANALYSIS</a:t>
             </a:r>
           </a:p>
         </p:txBody>
@@ -3617,8 +3626,8 @@
         </p:nvSpPr>
         <p:spPr>
           <a:xfrm flipH="false" flipV="false" rot="0">
-            <a:off x="4255877" y="884721"/>
-            <a:ext cx="12635155" cy="9402279"/>
+            <a:off x="4255877" y="1028700"/>
+            <a:ext cx="10466288" cy="9241697"/>
           </a:xfrm>
           <a:custGeom>
             <a:avLst/>
@@ -3627,18 +3636,18 @@
             <a:cxnLst/>
             <a:rect r="r" b="b" t="t" l="l"/>
             <a:pathLst>
-              <a:path h="9402279" w="12635155">
+              <a:path h="9241697" w="10466288">
                 <a:moveTo>
                   <a:pt x="0" y="0"/>
                 </a:moveTo>
                 <a:lnTo>
-                  <a:pt x="12635155" y="0"/>
-                </a:lnTo>
-                <a:lnTo>
-                  <a:pt x="12635155" y="9402279"/>
-                </a:lnTo>
-                <a:lnTo>
-                  <a:pt x="0" y="9402279"/>
+                  <a:pt x="10466288" y="0"/>
+                </a:lnTo>
+                <a:lnTo>
+                  <a:pt x="10466288" y="9241697"/>
+                </a:lnTo>
+                <a:lnTo>
+                  <a:pt x="0" y="9241697"/>
                 </a:lnTo>
                 <a:lnTo>
                   <a:pt x="0" y="0"/>
@@ -3657,13 +3666,643 @@
       </p:sp>
       <p:sp>
         <p:nvSpPr>
+          <p:cNvPr name="TextBox 4" id="4"/>
+          <p:cNvSpPr txBox="true"/>
+          <p:nvPr/>
+        </p:nvSpPr>
+        <p:spPr>
+          <a:xfrm rot="0">
+            <a:off x="4255877" y="-142875"/>
+            <a:ext cx="14032123" cy="1137679"/>
+          </a:xfrm>
+          <a:prstGeom prst="rect">
+            <a:avLst/>
+          </a:prstGeom>
+        </p:spPr>
+        <p:txBody>
+          <a:bodyPr anchor="t" rtlCol="false" tIns="0" lIns="0" bIns="0" rIns="0">
+            <a:spAutoFit/>
+          </a:bodyPr>
+          <a:lstStyle/>
+          <a:p>
+            <a:pPr marL="0" indent="0" lvl="0">
+              <a:lnSpc>
+                <a:spcPts val="9218"/>
+              </a:lnSpc>
+              <a:spcBef>
+                <a:spcPct val="0"/>
+              </a:spcBef>
+            </a:pPr>
+            <a:r>
+              <a:rPr lang="en-US" sz="6584">
+                <a:solidFill>
+                  <a:srgbClr val="05066D"/>
+                </a:solidFill>
+                <a:latin typeface="Cocomat Pro Heavy"/>
+              </a:rPr>
+              <a:t>CONSTRUCTION VS ECONOMY</a:t>
+            </a:r>
+          </a:p>
+        </p:txBody>
+      </p:sp>
+      <p:grpSp>
+        <p:nvGrpSpPr>
+          <p:cNvPr name="Group 5" id="5"/>
+          <p:cNvGrpSpPr/>
+          <p:nvPr/>
+        </p:nvGrpSpPr>
+        <p:grpSpPr>
+          <a:xfrm rot="0">
+            <a:off x="14240863" y="9258300"/>
+            <a:ext cx="3544228" cy="653292"/>
+            <a:chOff x="0" y="0"/>
+            <a:chExt cx="780800" cy="143921"/>
+          </a:xfrm>
+        </p:grpSpPr>
+        <p:sp>
+          <p:nvSpPr>
+            <p:cNvPr name="Freeform 6" id="6"/>
+            <p:cNvSpPr/>
+            <p:nvPr/>
+          </p:nvSpPr>
+          <p:spPr>
+            <a:xfrm flipH="false" flipV="false" rot="0">
+              <a:off x="0" y="0"/>
+              <a:ext cx="780800" cy="143921"/>
+            </a:xfrm>
+            <a:custGeom>
+              <a:avLst/>
+              <a:gdLst/>
+              <a:ahLst/>
+              <a:cxnLst/>
+              <a:rect r="r" b="b" t="t" l="l"/>
+              <a:pathLst>
+                <a:path h="143921" w="780800">
+                  <a:moveTo>
+                    <a:pt x="61162" y="0"/>
+                  </a:moveTo>
+                  <a:lnTo>
+                    <a:pt x="719638" y="0"/>
+                  </a:lnTo>
+                  <a:cubicBezTo>
+                    <a:pt x="753417" y="0"/>
+                    <a:pt x="780800" y="27383"/>
+                    <a:pt x="780800" y="61162"/>
+                  </a:cubicBezTo>
+                  <a:lnTo>
+                    <a:pt x="780800" y="82759"/>
+                  </a:lnTo>
+                  <a:cubicBezTo>
+                    <a:pt x="780800" y="116538"/>
+                    <a:pt x="753417" y="143921"/>
+                    <a:pt x="719638" y="143921"/>
+                  </a:cubicBezTo>
+                  <a:lnTo>
+                    <a:pt x="61162" y="143921"/>
+                  </a:lnTo>
+                  <a:cubicBezTo>
+                    <a:pt x="27383" y="143921"/>
+                    <a:pt x="0" y="116538"/>
+                    <a:pt x="0" y="82759"/>
+                  </a:cubicBezTo>
+                  <a:lnTo>
+                    <a:pt x="0" y="61162"/>
+                  </a:lnTo>
+                  <a:cubicBezTo>
+                    <a:pt x="0" y="27383"/>
+                    <a:pt x="27383" y="0"/>
+                    <a:pt x="61162" y="0"/>
+                  </a:cubicBezTo>
+                  <a:close/>
+                </a:path>
+              </a:pathLst>
+            </a:custGeom>
+            <a:solidFill>
+              <a:srgbClr val="2F7CB2"/>
+            </a:solidFill>
+          </p:spPr>
+        </p:sp>
+        <p:sp>
+          <p:nvSpPr>
+            <p:cNvPr name="TextBox 7" id="7"/>
+            <p:cNvSpPr txBox="true"/>
+            <p:nvPr/>
+          </p:nvSpPr>
+          <p:spPr>
+            <a:xfrm>
+              <a:off x="0" y="-38100"/>
+              <a:ext cx="812800" cy="850900"/>
+            </a:xfrm>
+            <a:prstGeom prst="rect">
+              <a:avLst/>
+            </a:prstGeom>
+          </p:spPr>
+          <p:txBody>
+            <a:bodyPr anchor="ctr" rtlCol="false" tIns="0" lIns="0" bIns="0" rIns="0"/>
+            <a:lstStyle/>
+            <a:p>
+              <a:pPr algn="ctr">
+                <a:lnSpc>
+                  <a:spcPts val="3041"/>
+                </a:lnSpc>
+              </a:pPr>
+              <a:r>
+                <a:rPr lang="en-US" sz="2203">
+                  <a:solidFill>
+                    <a:srgbClr val="FFFFFF"/>
+                  </a:solidFill>
+                  <a:latin typeface="Montserrat"/>
+                </a:rPr>
+                <a:t>VS PROVINCES</a:t>
+              </a:r>
+            </a:p>
+          </p:txBody>
+        </p:sp>
+      </p:grpSp>
+    </p:spTree>
+  </p:cSld>
+  <p:clrMapOvr>
+    <a:masterClrMapping/>
+  </p:clrMapOvr>
+</p:sld>
+</file>
+
+<file path=ppt/slides/slide11.xml><?xml version="1.0" encoding="utf-8"?>
+<p:sld xmlns:p="http://schemas.openxmlformats.org/presentationml/2006/main" xmlns:a="http://schemas.openxmlformats.org/drawingml/2006/main" xmlns:r="http://schemas.openxmlformats.org/officeDocument/2006/relationships">
+  <p:cSld>
+    <p:bg>
+      <p:bgPr>
+        <a:solidFill>
+          <a:srgbClr val="FBFAF8"/>
+        </a:solidFill>
+      </p:bgPr>
+    </p:bg>
+    <p:spTree>
+      <p:nvGrpSpPr>
+        <p:cNvPr id="1" name=""/>
+        <p:cNvGrpSpPr/>
+        <p:nvPr/>
+      </p:nvGrpSpPr>
+      <p:grpSpPr>
+        <a:xfrm>
+          <a:off x="0" y="0"/>
+          <a:ext cx="0" cy="0"/>
+          <a:chOff x="0" y="0"/>
+          <a:chExt cx="0" cy="0"/>
+        </a:xfrm>
+      </p:grpSpPr>
+      <p:sp>
+        <p:nvSpPr>
+          <p:cNvPr name="Freeform 2" id="2"/>
+          <p:cNvSpPr/>
+          <p:nvPr/>
+        </p:nvSpPr>
+        <p:spPr>
+          <a:xfrm flipH="false" flipV="false" rot="0">
+            <a:off x="-735272" y="-889902"/>
+            <a:ext cx="4991149" cy="7541571"/>
+          </a:xfrm>
+          <a:custGeom>
+            <a:avLst/>
+            <a:gdLst/>
+            <a:ahLst/>
+            <a:cxnLst/>
+            <a:rect r="r" b="b" t="t" l="l"/>
+            <a:pathLst>
+              <a:path h="7541571" w="4991149">
+                <a:moveTo>
+                  <a:pt x="0" y="0"/>
+                </a:moveTo>
+                <a:lnTo>
+                  <a:pt x="4991149" y="0"/>
+                </a:lnTo>
+                <a:lnTo>
+                  <a:pt x="4991149" y="7541572"/>
+                </a:lnTo>
+                <a:lnTo>
+                  <a:pt x="0" y="7541572"/>
+                </a:lnTo>
+                <a:lnTo>
+                  <a:pt x="0" y="0"/>
+                </a:lnTo>
+                <a:close/>
+              </a:path>
+            </a:pathLst>
+          </a:custGeom>
+          <a:blipFill>
+            <a:blip r:embed="rId2">
+              <a:alphaModFix amt="43999"/>
+              <a:extLst>
+                <a:ext uri="{96DAC541-7B7A-43D3-8B79-37D633B846F1}">
+                  <asvg:svgBlip xmlns:asvg="http://schemas.microsoft.com/office/drawing/2016/SVG/main" r:embed="rId3"/>
+                </a:ext>
+              </a:extLst>
+            </a:blip>
+            <a:stretch>
+              <a:fillRect l="0" t="0" r="0" b="0"/>
+            </a:stretch>
+          </a:blipFill>
+        </p:spPr>
+      </p:sp>
+      <p:sp>
+        <p:nvSpPr>
+          <p:cNvPr name="Freeform 3" id="3"/>
+          <p:cNvSpPr/>
+          <p:nvPr/>
+        </p:nvSpPr>
+        <p:spPr>
+          <a:xfrm flipH="false" flipV="false" rot="0">
+            <a:off x="2316903" y="871036"/>
+            <a:ext cx="15971097" cy="9396914"/>
+          </a:xfrm>
+          <a:custGeom>
+            <a:avLst/>
+            <a:gdLst/>
+            <a:ahLst/>
+            <a:cxnLst/>
+            <a:rect r="r" b="b" t="t" l="l"/>
+            <a:pathLst>
+              <a:path h="9396914" w="15971097">
+                <a:moveTo>
+                  <a:pt x="0" y="0"/>
+                </a:moveTo>
+                <a:lnTo>
+                  <a:pt x="15971097" y="0"/>
+                </a:lnTo>
+                <a:lnTo>
+                  <a:pt x="15971097" y="9396914"/>
+                </a:lnTo>
+                <a:lnTo>
+                  <a:pt x="0" y="9396914"/>
+                </a:lnTo>
+                <a:lnTo>
+                  <a:pt x="0" y="0"/>
+                </a:lnTo>
+                <a:close/>
+              </a:path>
+            </a:pathLst>
+          </a:custGeom>
+          <a:blipFill>
+            <a:blip r:embed="rId4"/>
+            <a:stretch>
+              <a:fillRect l="0" t="0" r="0" b="0"/>
+            </a:stretch>
+          </a:blipFill>
+        </p:spPr>
+      </p:sp>
+      <p:sp>
+        <p:nvSpPr>
+          <p:cNvPr name="TextBox 4" id="4"/>
+          <p:cNvSpPr txBox="true"/>
+          <p:nvPr/>
+        </p:nvSpPr>
+        <p:spPr>
+          <a:xfrm rot="0">
+            <a:off x="4255877" y="-142875"/>
+            <a:ext cx="14032123" cy="1203720"/>
+          </a:xfrm>
+          <a:prstGeom prst="rect">
+            <a:avLst/>
+          </a:prstGeom>
+        </p:spPr>
+        <p:txBody>
+          <a:bodyPr anchor="t" rtlCol="false" tIns="0" lIns="0" bIns="0" rIns="0">
+            <a:spAutoFit/>
+          </a:bodyPr>
+          <a:lstStyle/>
+          <a:p>
+            <a:pPr marL="0" indent="0" lvl="0">
+              <a:lnSpc>
+                <a:spcPts val="9778"/>
+              </a:lnSpc>
+              <a:spcBef>
+                <a:spcPct val="0"/>
+              </a:spcBef>
+            </a:pPr>
+            <a:r>
+              <a:rPr lang="en-US" sz="6984">
+                <a:solidFill>
+                  <a:srgbClr val="05066D"/>
+                </a:solidFill>
+                <a:latin typeface="Cocomat Pro Heavy"/>
+              </a:rPr>
+              <a:t>COMPLETED CONSTRUCTION</a:t>
+            </a:r>
+          </a:p>
+        </p:txBody>
+      </p:sp>
+    </p:spTree>
+  </p:cSld>
+  <p:clrMapOvr>
+    <a:masterClrMapping/>
+  </p:clrMapOvr>
+</p:sld>
+</file>
+
+<file path=ppt/slides/slide12.xml><?xml version="1.0" encoding="utf-8"?>
+<p:sld xmlns:p="http://schemas.openxmlformats.org/presentationml/2006/main" xmlns:a="http://schemas.openxmlformats.org/drawingml/2006/main" xmlns:r="http://schemas.openxmlformats.org/officeDocument/2006/relationships">
+  <p:cSld>
+    <p:bg>
+      <p:bgPr>
+        <a:solidFill>
+          <a:srgbClr val="FBFAF8"/>
+        </a:solidFill>
+      </p:bgPr>
+    </p:bg>
+    <p:spTree>
+      <p:nvGrpSpPr>
+        <p:cNvPr id="1" name=""/>
+        <p:cNvGrpSpPr/>
+        <p:nvPr/>
+      </p:nvGrpSpPr>
+      <p:grpSpPr>
+        <a:xfrm>
+          <a:off x="0" y="0"/>
+          <a:ext cx="0" cy="0"/>
+          <a:chOff x="0" y="0"/>
+          <a:chExt cx="0" cy="0"/>
+        </a:xfrm>
+      </p:grpSpPr>
+      <p:sp>
+        <p:nvSpPr>
+          <p:cNvPr name="Freeform 2" id="2"/>
+          <p:cNvSpPr/>
+          <p:nvPr/>
+        </p:nvSpPr>
+        <p:spPr>
+          <a:xfrm flipH="false" flipV="false" rot="0">
+            <a:off x="-735272" y="-889902"/>
+            <a:ext cx="4991149" cy="7541571"/>
+          </a:xfrm>
+          <a:custGeom>
+            <a:avLst/>
+            <a:gdLst/>
+            <a:ahLst/>
+            <a:cxnLst/>
+            <a:rect r="r" b="b" t="t" l="l"/>
+            <a:pathLst>
+              <a:path h="7541571" w="4991149">
+                <a:moveTo>
+                  <a:pt x="0" y="0"/>
+                </a:moveTo>
+                <a:lnTo>
+                  <a:pt x="4991149" y="0"/>
+                </a:lnTo>
+                <a:lnTo>
+                  <a:pt x="4991149" y="7541572"/>
+                </a:lnTo>
+                <a:lnTo>
+                  <a:pt x="0" y="7541572"/>
+                </a:lnTo>
+                <a:lnTo>
+                  <a:pt x="0" y="0"/>
+                </a:lnTo>
+                <a:close/>
+              </a:path>
+            </a:pathLst>
+          </a:custGeom>
+          <a:blipFill>
+            <a:blip r:embed="rId2">
+              <a:alphaModFix amt="43999"/>
+              <a:extLst>
+                <a:ext uri="{96DAC541-7B7A-43D3-8B79-37D633B846F1}">
+                  <asvg:svgBlip xmlns:asvg="http://schemas.microsoft.com/office/drawing/2016/SVG/main" r:embed="rId3"/>
+                </a:ext>
+              </a:extLst>
+            </a:blip>
+            <a:stretch>
+              <a:fillRect l="0" t="0" r="0" b="0"/>
+            </a:stretch>
+          </a:blipFill>
+        </p:spPr>
+      </p:sp>
+      <p:sp>
+        <p:nvSpPr>
+          <p:cNvPr name="Freeform 3" id="3"/>
+          <p:cNvSpPr/>
+          <p:nvPr/>
+        </p:nvSpPr>
+        <p:spPr>
+          <a:xfrm flipH="false" flipV="false" rot="0">
+            <a:off x="2316903" y="890086"/>
+            <a:ext cx="15971097" cy="9367663"/>
+          </a:xfrm>
+          <a:custGeom>
+            <a:avLst/>
+            <a:gdLst/>
+            <a:ahLst/>
+            <a:cxnLst/>
+            <a:rect r="r" b="b" t="t" l="l"/>
+            <a:pathLst>
+              <a:path h="9367663" w="15971097">
+                <a:moveTo>
+                  <a:pt x="0" y="0"/>
+                </a:moveTo>
+                <a:lnTo>
+                  <a:pt x="15971097" y="0"/>
+                </a:lnTo>
+                <a:lnTo>
+                  <a:pt x="15971097" y="9367663"/>
+                </a:lnTo>
+                <a:lnTo>
+                  <a:pt x="0" y="9367663"/>
+                </a:lnTo>
+                <a:lnTo>
+                  <a:pt x="0" y="0"/>
+                </a:lnTo>
+                <a:close/>
+              </a:path>
+            </a:pathLst>
+          </a:custGeom>
+          <a:blipFill>
+            <a:blip r:embed="rId4"/>
+            <a:stretch>
+              <a:fillRect l="0" t="0" r="0" b="0"/>
+            </a:stretch>
+          </a:blipFill>
+        </p:spPr>
+      </p:sp>
+      <p:sp>
+        <p:nvSpPr>
+          <p:cNvPr name="TextBox 4" id="4"/>
+          <p:cNvSpPr txBox="true"/>
+          <p:nvPr/>
+        </p:nvSpPr>
+        <p:spPr>
+          <a:xfrm rot="0">
+            <a:off x="4255877" y="-114300"/>
+            <a:ext cx="14032123" cy="913131"/>
+          </a:xfrm>
+          <a:prstGeom prst="rect">
+            <a:avLst/>
+          </a:prstGeom>
+        </p:spPr>
+        <p:txBody>
+          <a:bodyPr anchor="t" rtlCol="false" tIns="0" lIns="0" bIns="0" rIns="0">
+            <a:spAutoFit/>
+          </a:bodyPr>
+          <a:lstStyle/>
+          <a:p>
+            <a:pPr marL="0" indent="0" lvl="0">
+              <a:lnSpc>
+                <a:spcPts val="7419"/>
+              </a:lnSpc>
+              <a:spcBef>
+                <a:spcPct val="0"/>
+              </a:spcBef>
+            </a:pPr>
+            <a:r>
+              <a:rPr lang="en-US" sz="5299">
+                <a:solidFill>
+                  <a:srgbClr val="05066D"/>
+                </a:solidFill>
+                <a:latin typeface="Cocomat Pro Heavy"/>
+              </a:rPr>
+              <a:t> CONSTRUCTION VS ECONOMIC CRISIS</a:t>
+            </a:r>
+          </a:p>
+        </p:txBody>
+      </p:sp>
+    </p:spTree>
+  </p:cSld>
+  <p:clrMapOvr>
+    <a:masterClrMapping/>
+  </p:clrMapOvr>
+</p:sld>
+</file>
+
+<file path=ppt/slides/slide13.xml><?xml version="1.0" encoding="utf-8"?>
+<p:sld xmlns:p="http://schemas.openxmlformats.org/presentationml/2006/main" xmlns:a="http://schemas.openxmlformats.org/drawingml/2006/main" xmlns:r="http://schemas.openxmlformats.org/officeDocument/2006/relationships">
+  <p:cSld>
+    <p:bg>
+      <p:bgPr>
+        <a:solidFill>
+          <a:srgbClr val="FBFAF8"/>
+        </a:solidFill>
+      </p:bgPr>
+    </p:bg>
+    <p:spTree>
+      <p:nvGrpSpPr>
+        <p:cNvPr id="1" name=""/>
+        <p:cNvGrpSpPr/>
+        <p:nvPr/>
+      </p:nvGrpSpPr>
+      <p:grpSpPr>
+        <a:xfrm>
+          <a:off x="0" y="0"/>
+          <a:ext cx="0" cy="0"/>
+          <a:chOff x="0" y="0"/>
+          <a:chExt cx="0" cy="0"/>
+        </a:xfrm>
+      </p:grpSpPr>
+      <p:sp>
+        <p:nvSpPr>
+          <p:cNvPr name="Freeform 2" id="2"/>
+          <p:cNvSpPr/>
+          <p:nvPr/>
+        </p:nvSpPr>
+        <p:spPr>
+          <a:xfrm flipH="false" flipV="false" rot="0">
+            <a:off x="-735272" y="-889902"/>
+            <a:ext cx="4991149" cy="7541571"/>
+          </a:xfrm>
+          <a:custGeom>
+            <a:avLst/>
+            <a:gdLst/>
+            <a:ahLst/>
+            <a:cxnLst/>
+            <a:rect r="r" b="b" t="t" l="l"/>
+            <a:pathLst>
+              <a:path h="7541571" w="4991149">
+                <a:moveTo>
+                  <a:pt x="0" y="0"/>
+                </a:moveTo>
+                <a:lnTo>
+                  <a:pt x="4991149" y="0"/>
+                </a:lnTo>
+                <a:lnTo>
+                  <a:pt x="4991149" y="7541572"/>
+                </a:lnTo>
+                <a:lnTo>
+                  <a:pt x="0" y="7541572"/>
+                </a:lnTo>
+                <a:lnTo>
+                  <a:pt x="0" y="0"/>
+                </a:lnTo>
+                <a:close/>
+              </a:path>
+            </a:pathLst>
+          </a:custGeom>
+          <a:blipFill>
+            <a:blip r:embed="rId2">
+              <a:alphaModFix amt="43999"/>
+              <a:extLst>
+                <a:ext uri="{96DAC541-7B7A-43D3-8B79-37D633B846F1}">
+                  <asvg:svgBlip xmlns:asvg="http://schemas.microsoft.com/office/drawing/2016/SVG/main" r:embed="rId3"/>
+                </a:ext>
+              </a:extLst>
+            </a:blip>
+            <a:stretch>
+              <a:fillRect l="0" t="0" r="0" b="0"/>
+            </a:stretch>
+          </a:blipFill>
+        </p:spPr>
+      </p:sp>
+      <p:sp>
+        <p:nvSpPr>
+          <p:cNvPr name="Freeform 3" id="3"/>
+          <p:cNvSpPr/>
+          <p:nvPr/>
+        </p:nvSpPr>
+        <p:spPr>
+          <a:xfrm flipH="false" flipV="false" rot="0">
+            <a:off x="2316903" y="890086"/>
+            <a:ext cx="15971097" cy="9367663"/>
+          </a:xfrm>
+          <a:custGeom>
+            <a:avLst/>
+            <a:gdLst/>
+            <a:ahLst/>
+            <a:cxnLst/>
+            <a:rect r="r" b="b" t="t" l="l"/>
+            <a:pathLst>
+              <a:path h="9367663" w="15971097">
+                <a:moveTo>
+                  <a:pt x="0" y="0"/>
+                </a:moveTo>
+                <a:lnTo>
+                  <a:pt x="15971097" y="0"/>
+                </a:lnTo>
+                <a:lnTo>
+                  <a:pt x="15971097" y="9367663"/>
+                </a:lnTo>
+                <a:lnTo>
+                  <a:pt x="0" y="9367663"/>
+                </a:lnTo>
+                <a:lnTo>
+                  <a:pt x="0" y="0"/>
+                </a:lnTo>
+                <a:close/>
+              </a:path>
+            </a:pathLst>
+          </a:custGeom>
+          <a:blipFill>
+            <a:blip r:embed="rId4"/>
+            <a:stretch>
+              <a:fillRect l="0" t="0" r="0" b="0"/>
+            </a:stretch>
+          </a:blipFill>
+        </p:spPr>
+      </p:sp>
+      <p:sp>
+        <p:nvSpPr>
           <p:cNvPr name="Freeform 4" id="4"/>
           <p:cNvSpPr/>
           <p:nvPr/>
         </p:nvSpPr>
         <p:spPr>
           <a:xfrm flipH="true" flipV="false" rot="-6906173">
-            <a:off x="13233119" y="3804516"/>
+            <a:off x="14169020" y="3512585"/>
             <a:ext cx="1700642" cy="480431"/>
           </a:xfrm>
           <a:custGeom>
@@ -3707,56 +4346,15 @@
           </a:blipFill>
         </p:spPr>
       </p:sp>
-      <p:sp>
-        <p:nvSpPr>
-          <p:cNvPr name="TextBox 5" id="5"/>
-          <p:cNvSpPr txBox="true"/>
-          <p:nvPr/>
-        </p:nvSpPr>
-        <p:spPr>
-          <a:xfrm rot="0">
-            <a:off x="4255877" y="-142875"/>
-            <a:ext cx="14032123" cy="1203720"/>
-          </a:xfrm>
-          <a:prstGeom prst="rect">
-            <a:avLst/>
-          </a:prstGeom>
-        </p:spPr>
-        <p:txBody>
-          <a:bodyPr anchor="t" rtlCol="false" tIns="0" lIns="0" bIns="0" rIns="0">
-            <a:spAutoFit/>
-          </a:bodyPr>
-          <a:lstStyle/>
-          <a:p>
-            <a:pPr marL="0" indent="0" lvl="0">
-              <a:lnSpc>
-                <a:spcPts val="9778"/>
-              </a:lnSpc>
-              <a:spcBef>
-                <a:spcPct val="0"/>
-              </a:spcBef>
-            </a:pPr>
-            <a:r>
-              <a:rPr lang="en-US" sz="6984">
-                <a:solidFill>
-                  <a:srgbClr val="05066D"/>
-                </a:solidFill>
-                <a:latin typeface="Cocomat Pro Heavy"/>
-              </a:rPr>
-              <a:t>COMPLETED CONSTRUCTION</a:t>
-            </a:r>
-          </a:p>
-        </p:txBody>
-      </p:sp>
       <p:grpSp>
         <p:nvGrpSpPr>
-          <p:cNvPr name="Group 6" id="6"/>
+          <p:cNvPr name="Group 5" id="5"/>
           <p:cNvGrpSpPr/>
           <p:nvPr/>
         </p:nvGrpSpPr>
         <p:grpSpPr>
           <a:xfrm rot="0">
-            <a:off x="5424169" y="7303138"/>
+            <a:off x="5727705" y="7112386"/>
             <a:ext cx="8147674" cy="1613887"/>
             <a:chOff x="0" y="0"/>
             <a:chExt cx="1125145" cy="222868"/>
@@ -3764,7 +4362,7 @@
         </p:grpSpPr>
         <p:sp>
           <p:nvSpPr>
-            <p:cNvPr name="Freeform 7" id="7"/>
+            <p:cNvPr name="Freeform 6" id="6"/>
             <p:cNvSpPr/>
             <p:nvPr/>
           </p:nvSpPr>
@@ -3847,7 +4445,7 @@
         </p:sp>
         <p:sp>
           <p:nvSpPr>
-            <p:cNvPr name="TextBox 8" id="8"/>
+            <p:cNvPr name="TextBox 7" id="7"/>
             <p:cNvSpPr txBox="true"/>
             <p:nvPr/>
           </p:nvSpPr>
@@ -3875,13 +4473,13 @@
       </p:grpSp>
       <p:sp>
         <p:nvSpPr>
-          <p:cNvPr name="TextBox 9" id="9"/>
+          <p:cNvPr name="TextBox 8" id="8"/>
           <p:cNvSpPr txBox="true"/>
           <p:nvPr/>
         </p:nvSpPr>
         <p:spPr>
           <a:xfrm rot="0">
-            <a:off x="5872375" y="7896643"/>
+            <a:off x="6175910" y="7705890"/>
             <a:ext cx="7547341" cy="781727"/>
           </a:xfrm>
           <a:prstGeom prst="rect">
@@ -3916,13 +4514,13 @@
       </p:sp>
       <p:sp>
         <p:nvSpPr>
-          <p:cNvPr name="TextBox 10" id="10"/>
+          <p:cNvPr name="TextBox 9" id="9"/>
           <p:cNvSpPr txBox="true"/>
           <p:nvPr/>
         </p:nvSpPr>
         <p:spPr>
           <a:xfrm rot="0">
-            <a:off x="5872375" y="7437545"/>
+            <a:off x="6175910" y="7246792"/>
             <a:ext cx="7347171" cy="506723"/>
           </a:xfrm>
           <a:prstGeom prst="rect">
@@ -3955,6 +4553,47 @@
           </a:p>
         </p:txBody>
       </p:sp>
+      <p:sp>
+        <p:nvSpPr>
+          <p:cNvPr name="TextBox 10" id="10"/>
+          <p:cNvSpPr txBox="true"/>
+          <p:nvPr/>
+        </p:nvSpPr>
+        <p:spPr>
+          <a:xfrm rot="0">
+            <a:off x="4255877" y="-114300"/>
+            <a:ext cx="14032123" cy="913131"/>
+          </a:xfrm>
+          <a:prstGeom prst="rect">
+            <a:avLst/>
+          </a:prstGeom>
+        </p:spPr>
+        <p:txBody>
+          <a:bodyPr anchor="t" rtlCol="false" tIns="0" lIns="0" bIns="0" rIns="0">
+            <a:spAutoFit/>
+          </a:bodyPr>
+          <a:lstStyle/>
+          <a:p>
+            <a:pPr marL="0" indent="0" lvl="0">
+              <a:lnSpc>
+                <a:spcPts val="7419"/>
+              </a:lnSpc>
+              <a:spcBef>
+                <a:spcPct val="0"/>
+              </a:spcBef>
+            </a:pPr>
+            <a:r>
+              <a:rPr lang="en-US" sz="5299">
+                <a:solidFill>
+                  <a:srgbClr val="05066D"/>
+                </a:solidFill>
+                <a:latin typeface="Cocomat Pro Heavy"/>
+              </a:rPr>
+              <a:t> CONSTRUCTION VS ECONOMIC CRISIS</a:t>
+            </a:r>
+          </a:p>
+        </p:txBody>
+      </p:sp>
     </p:spTree>
   </p:cSld>
   <p:clrMapOvr>
@@ -3963,7 +4602,7 @@
 </p:sld>
 </file>
 
-<file path=ppt/slides/slide11.xml><?xml version="1.0" encoding="utf-8"?>
+<file path=ppt/slides/slide14.xml><?xml version="1.0" encoding="utf-8"?>
 <p:sld xmlns:p="http://schemas.openxmlformats.org/presentationml/2006/main" xmlns:a="http://schemas.openxmlformats.org/drawingml/2006/main" xmlns:r="http://schemas.openxmlformats.org/officeDocument/2006/relationships">
   <p:cSld>
     <p:bg>
@@ -3995,8 +4634,8 @@
         </p:nvSpPr>
         <p:spPr>
           <a:xfrm flipH="false" flipV="false" rot="0">
-            <a:off x="-1930093" y="7159596"/>
-            <a:ext cx="22473900" cy="7069063"/>
+            <a:off x="-735272" y="-889902"/>
+            <a:ext cx="4991149" cy="7541571"/>
           </a:xfrm>
           <a:custGeom>
             <a:avLst/>
@@ -4005,18 +4644,18 @@
             <a:cxnLst/>
             <a:rect r="r" b="b" t="t" l="l"/>
             <a:pathLst>
-              <a:path h="7069063" w="22473900">
+              <a:path h="7541571" w="4991149">
                 <a:moveTo>
                   <a:pt x="0" y="0"/>
                 </a:moveTo>
                 <a:lnTo>
-                  <a:pt x="22473899" y="0"/>
-                </a:lnTo>
-                <a:lnTo>
-                  <a:pt x="22473899" y="7069063"/>
-                </a:lnTo>
-                <a:lnTo>
-                  <a:pt x="0" y="7069063"/>
+                  <a:pt x="4991149" y="0"/>
+                </a:lnTo>
+                <a:lnTo>
+                  <a:pt x="4991149" y="7541572"/>
+                </a:lnTo>
+                <a:lnTo>
+                  <a:pt x="0" y="7541572"/>
                 </a:lnTo>
                 <a:lnTo>
                   <a:pt x="0" y="0"/>
@@ -4042,6 +4681,626 @@
       </p:sp>
       <p:sp>
         <p:nvSpPr>
+          <p:cNvPr name="Freeform 3" id="3"/>
+          <p:cNvSpPr/>
+          <p:nvPr/>
+        </p:nvSpPr>
+        <p:spPr>
+          <a:xfrm flipH="false" flipV="false" rot="0">
+            <a:off x="2316903" y="890086"/>
+            <a:ext cx="15971097" cy="9393902"/>
+          </a:xfrm>
+          <a:custGeom>
+            <a:avLst/>
+            <a:gdLst/>
+            <a:ahLst/>
+            <a:cxnLst/>
+            <a:rect r="r" b="b" t="t" l="l"/>
+            <a:pathLst>
+              <a:path h="9393902" w="15971097">
+                <a:moveTo>
+                  <a:pt x="0" y="0"/>
+                </a:moveTo>
+                <a:lnTo>
+                  <a:pt x="15971097" y="0"/>
+                </a:lnTo>
+                <a:lnTo>
+                  <a:pt x="15971097" y="9393902"/>
+                </a:lnTo>
+                <a:lnTo>
+                  <a:pt x="0" y="9393902"/>
+                </a:lnTo>
+                <a:lnTo>
+                  <a:pt x="0" y="0"/>
+                </a:lnTo>
+                <a:close/>
+              </a:path>
+            </a:pathLst>
+          </a:custGeom>
+          <a:blipFill>
+            <a:blip r:embed="rId4"/>
+            <a:stretch>
+              <a:fillRect l="0" t="0" r="0" b="0"/>
+            </a:stretch>
+          </a:blipFill>
+        </p:spPr>
+      </p:sp>
+      <p:sp>
+        <p:nvSpPr>
+          <p:cNvPr name="TextBox 4" id="4"/>
+          <p:cNvSpPr txBox="true"/>
+          <p:nvPr/>
+        </p:nvSpPr>
+        <p:spPr>
+          <a:xfrm rot="0">
+            <a:off x="4255877" y="-123825"/>
+            <a:ext cx="14032123" cy="1012584"/>
+          </a:xfrm>
+          <a:prstGeom prst="rect">
+            <a:avLst/>
+          </a:prstGeom>
+        </p:spPr>
+        <p:txBody>
+          <a:bodyPr anchor="t" rtlCol="false" tIns="0" lIns="0" bIns="0" rIns="0">
+            <a:spAutoFit/>
+          </a:bodyPr>
+          <a:lstStyle/>
+          <a:p>
+            <a:pPr marL="0" indent="0" lvl="0">
+              <a:lnSpc>
+                <a:spcPts val="8238"/>
+              </a:lnSpc>
+              <a:spcBef>
+                <a:spcPct val="0"/>
+              </a:spcBef>
+            </a:pPr>
+            <a:r>
+              <a:rPr lang="en-US" sz="5884">
+                <a:solidFill>
+                  <a:srgbClr val="05066D"/>
+                </a:solidFill>
+                <a:latin typeface="Cocomat Pro Heavy"/>
+              </a:rPr>
+              <a:t>CONSTRUCTION TOP 3 PROVINCES</a:t>
+            </a:r>
+          </a:p>
+        </p:txBody>
+      </p:sp>
+      <p:grpSp>
+        <p:nvGrpSpPr>
+          <p:cNvPr name="Group 5" id="5"/>
+          <p:cNvGrpSpPr/>
+          <p:nvPr/>
+        </p:nvGrpSpPr>
+        <p:grpSpPr>
+          <a:xfrm rot="0">
+            <a:off x="14743772" y="5587037"/>
+            <a:ext cx="3544228" cy="653292"/>
+            <a:chOff x="0" y="0"/>
+            <a:chExt cx="780800" cy="143921"/>
+          </a:xfrm>
+        </p:grpSpPr>
+        <p:sp>
+          <p:nvSpPr>
+            <p:cNvPr name="Freeform 6" id="6"/>
+            <p:cNvSpPr/>
+            <p:nvPr/>
+          </p:nvSpPr>
+          <p:spPr>
+            <a:xfrm flipH="false" flipV="false" rot="0">
+              <a:off x="0" y="0"/>
+              <a:ext cx="780800" cy="143921"/>
+            </a:xfrm>
+            <a:custGeom>
+              <a:avLst/>
+              <a:gdLst/>
+              <a:ahLst/>
+              <a:cxnLst/>
+              <a:rect r="r" b="b" t="t" l="l"/>
+              <a:pathLst>
+                <a:path h="143921" w="780800">
+                  <a:moveTo>
+                    <a:pt x="61162" y="0"/>
+                  </a:moveTo>
+                  <a:lnTo>
+                    <a:pt x="719638" y="0"/>
+                  </a:lnTo>
+                  <a:cubicBezTo>
+                    <a:pt x="753417" y="0"/>
+                    <a:pt x="780800" y="27383"/>
+                    <a:pt x="780800" y="61162"/>
+                  </a:cubicBezTo>
+                  <a:lnTo>
+                    <a:pt x="780800" y="82759"/>
+                  </a:lnTo>
+                  <a:cubicBezTo>
+                    <a:pt x="780800" y="116538"/>
+                    <a:pt x="753417" y="143921"/>
+                    <a:pt x="719638" y="143921"/>
+                  </a:cubicBezTo>
+                  <a:lnTo>
+                    <a:pt x="61162" y="143921"/>
+                  </a:lnTo>
+                  <a:cubicBezTo>
+                    <a:pt x="27383" y="143921"/>
+                    <a:pt x="0" y="116538"/>
+                    <a:pt x="0" y="82759"/>
+                  </a:cubicBezTo>
+                  <a:lnTo>
+                    <a:pt x="0" y="61162"/>
+                  </a:lnTo>
+                  <a:cubicBezTo>
+                    <a:pt x="0" y="27383"/>
+                    <a:pt x="27383" y="0"/>
+                    <a:pt x="61162" y="0"/>
+                  </a:cubicBezTo>
+                  <a:close/>
+                </a:path>
+              </a:pathLst>
+            </a:custGeom>
+            <a:solidFill>
+              <a:srgbClr val="2F7CB2"/>
+            </a:solidFill>
+          </p:spPr>
+        </p:sp>
+        <p:sp>
+          <p:nvSpPr>
+            <p:cNvPr name="TextBox 7" id="7"/>
+            <p:cNvSpPr txBox="true"/>
+            <p:nvPr/>
+          </p:nvSpPr>
+          <p:spPr>
+            <a:xfrm>
+              <a:off x="0" y="-38100"/>
+              <a:ext cx="812800" cy="850900"/>
+            </a:xfrm>
+            <a:prstGeom prst="rect">
+              <a:avLst/>
+            </a:prstGeom>
+          </p:spPr>
+          <p:txBody>
+            <a:bodyPr anchor="ctr" rtlCol="false" tIns="0" lIns="0" bIns="0" rIns="0"/>
+            <a:lstStyle/>
+            <a:p>
+              <a:pPr algn="ctr">
+                <a:lnSpc>
+                  <a:spcPts val="3041"/>
+                </a:lnSpc>
+              </a:pPr>
+              <a:r>
+                <a:rPr lang="en-US" sz="2203">
+                  <a:solidFill>
+                    <a:srgbClr val="FFFFFF"/>
+                  </a:solidFill>
+                  <a:latin typeface="Montserrat"/>
+                </a:rPr>
+                <a:t>PER CAPTIA?</a:t>
+              </a:r>
+            </a:p>
+          </p:txBody>
+        </p:sp>
+      </p:grpSp>
+      <p:grpSp>
+        <p:nvGrpSpPr>
+          <p:cNvPr name="Group 8" id="8"/>
+          <p:cNvGrpSpPr/>
+          <p:nvPr/>
+        </p:nvGrpSpPr>
+        <p:grpSpPr>
+          <a:xfrm rot="0">
+            <a:off x="14743772" y="6624748"/>
+            <a:ext cx="3544228" cy="653292"/>
+            <a:chOff x="0" y="0"/>
+            <a:chExt cx="780800" cy="143921"/>
+          </a:xfrm>
+        </p:grpSpPr>
+        <p:sp>
+          <p:nvSpPr>
+            <p:cNvPr name="Freeform 9" id="9"/>
+            <p:cNvSpPr/>
+            <p:nvPr/>
+          </p:nvSpPr>
+          <p:spPr>
+            <a:xfrm flipH="false" flipV="false" rot="0">
+              <a:off x="0" y="0"/>
+              <a:ext cx="780800" cy="143921"/>
+            </a:xfrm>
+            <a:custGeom>
+              <a:avLst/>
+              <a:gdLst/>
+              <a:ahLst/>
+              <a:cxnLst/>
+              <a:rect r="r" b="b" t="t" l="l"/>
+              <a:pathLst>
+                <a:path h="143921" w="780800">
+                  <a:moveTo>
+                    <a:pt x="61162" y="0"/>
+                  </a:moveTo>
+                  <a:lnTo>
+                    <a:pt x="719638" y="0"/>
+                  </a:lnTo>
+                  <a:cubicBezTo>
+                    <a:pt x="753417" y="0"/>
+                    <a:pt x="780800" y="27383"/>
+                    <a:pt x="780800" y="61162"/>
+                  </a:cubicBezTo>
+                  <a:lnTo>
+                    <a:pt x="780800" y="82759"/>
+                  </a:lnTo>
+                  <a:cubicBezTo>
+                    <a:pt x="780800" y="116538"/>
+                    <a:pt x="753417" y="143921"/>
+                    <a:pt x="719638" y="143921"/>
+                  </a:cubicBezTo>
+                  <a:lnTo>
+                    <a:pt x="61162" y="143921"/>
+                  </a:lnTo>
+                  <a:cubicBezTo>
+                    <a:pt x="27383" y="143921"/>
+                    <a:pt x="0" y="116538"/>
+                    <a:pt x="0" y="82759"/>
+                  </a:cubicBezTo>
+                  <a:lnTo>
+                    <a:pt x="0" y="61162"/>
+                  </a:lnTo>
+                  <a:cubicBezTo>
+                    <a:pt x="0" y="27383"/>
+                    <a:pt x="27383" y="0"/>
+                    <a:pt x="61162" y="0"/>
+                  </a:cubicBezTo>
+                  <a:close/>
+                </a:path>
+              </a:pathLst>
+            </a:custGeom>
+            <a:solidFill>
+              <a:srgbClr val="2F7CB2"/>
+            </a:solidFill>
+          </p:spPr>
+        </p:sp>
+        <p:sp>
+          <p:nvSpPr>
+            <p:cNvPr name="TextBox 10" id="10"/>
+            <p:cNvSpPr txBox="true"/>
+            <p:nvPr/>
+          </p:nvSpPr>
+          <p:spPr>
+            <a:xfrm>
+              <a:off x="0" y="-38100"/>
+              <a:ext cx="812800" cy="850900"/>
+            </a:xfrm>
+            <a:prstGeom prst="rect">
+              <a:avLst/>
+            </a:prstGeom>
+          </p:spPr>
+          <p:txBody>
+            <a:bodyPr anchor="ctr" rtlCol="false" tIns="0" lIns="0" bIns="0" rIns="0"/>
+            <a:lstStyle/>
+            <a:p>
+              <a:pPr algn="ctr">
+                <a:lnSpc>
+                  <a:spcPts val="3041"/>
+                </a:lnSpc>
+              </a:pPr>
+              <a:r>
+                <a:rPr lang="en-US" sz="2203">
+                  <a:solidFill>
+                    <a:srgbClr val="FFFFFF"/>
+                  </a:solidFill>
+                  <a:latin typeface="Montserrat"/>
+                </a:rPr>
+                <a:t>VS EARNINGS?</a:t>
+              </a:r>
+            </a:p>
+          </p:txBody>
+        </p:sp>
+      </p:grpSp>
+    </p:spTree>
+  </p:cSld>
+  <p:clrMapOvr>
+    <a:masterClrMapping/>
+  </p:clrMapOvr>
+</p:sld>
+</file>
+
+<file path=ppt/slides/slide15.xml><?xml version="1.0" encoding="utf-8"?>
+<p:sld xmlns:p="http://schemas.openxmlformats.org/presentationml/2006/main" xmlns:a="http://schemas.openxmlformats.org/drawingml/2006/main" xmlns:r="http://schemas.openxmlformats.org/officeDocument/2006/relationships">
+  <p:cSld>
+    <p:bg>
+      <p:bgPr>
+        <a:solidFill>
+          <a:srgbClr val="FBFAF8"/>
+        </a:solidFill>
+      </p:bgPr>
+    </p:bg>
+    <p:spTree>
+      <p:nvGrpSpPr>
+        <p:cNvPr id="1" name=""/>
+        <p:cNvGrpSpPr/>
+        <p:nvPr/>
+      </p:nvGrpSpPr>
+      <p:grpSpPr>
+        <a:xfrm>
+          <a:off x="0" y="0"/>
+          <a:ext cx="0" cy="0"/>
+          <a:chOff x="0" y="0"/>
+          <a:chExt cx="0" cy="0"/>
+        </a:xfrm>
+      </p:grpSpPr>
+      <p:sp>
+        <p:nvSpPr>
+          <p:cNvPr name="Freeform 2" id="2"/>
+          <p:cNvSpPr/>
+          <p:nvPr/>
+        </p:nvSpPr>
+        <p:spPr>
+          <a:xfrm flipH="false" flipV="false" rot="0">
+            <a:off x="-1930093" y="7159596"/>
+            <a:ext cx="22473900" cy="7069063"/>
+          </a:xfrm>
+          <a:custGeom>
+            <a:avLst/>
+            <a:gdLst/>
+            <a:ahLst/>
+            <a:cxnLst/>
+            <a:rect r="r" b="b" t="t" l="l"/>
+            <a:pathLst>
+              <a:path h="7069063" w="22473900">
+                <a:moveTo>
+                  <a:pt x="0" y="0"/>
+                </a:moveTo>
+                <a:lnTo>
+                  <a:pt x="22473899" y="0"/>
+                </a:lnTo>
+                <a:lnTo>
+                  <a:pt x="22473899" y="7069063"/>
+                </a:lnTo>
+                <a:lnTo>
+                  <a:pt x="0" y="7069063"/>
+                </a:lnTo>
+                <a:lnTo>
+                  <a:pt x="0" y="0"/>
+                </a:lnTo>
+                <a:close/>
+              </a:path>
+            </a:pathLst>
+          </a:custGeom>
+          <a:blipFill>
+            <a:blip r:embed="rId2">
+              <a:alphaModFix amt="43999"/>
+              <a:extLst>
+                <a:ext uri="{96DAC541-7B7A-43D3-8B79-37D633B846F1}">
+                  <asvg:svgBlip xmlns:asvg="http://schemas.microsoft.com/office/drawing/2016/SVG/main" r:embed="rId3"/>
+                </a:ext>
+              </a:extLst>
+            </a:blip>
+            <a:stretch>
+              <a:fillRect l="0" t="0" r="0" b="0"/>
+            </a:stretch>
+          </a:blipFill>
+        </p:spPr>
+      </p:sp>
+      <p:sp>
+        <p:nvSpPr>
+          <p:cNvPr name="Freeform 3" id="3"/>
+          <p:cNvSpPr/>
+          <p:nvPr/>
+        </p:nvSpPr>
+        <p:spPr>
+          <a:xfrm flipH="false" flipV="false" rot="0">
+            <a:off x="-18436591" y="-3534532"/>
+            <a:ext cx="22473900" cy="7069063"/>
+          </a:xfrm>
+          <a:custGeom>
+            <a:avLst/>
+            <a:gdLst/>
+            <a:ahLst/>
+            <a:cxnLst/>
+            <a:rect r="r" b="b" t="t" l="l"/>
+            <a:pathLst>
+              <a:path h="7069063" w="22473900">
+                <a:moveTo>
+                  <a:pt x="0" y="0"/>
+                </a:moveTo>
+                <a:lnTo>
+                  <a:pt x="22473900" y="0"/>
+                </a:lnTo>
+                <a:lnTo>
+                  <a:pt x="22473900" y="7069064"/>
+                </a:lnTo>
+                <a:lnTo>
+                  <a:pt x="0" y="7069064"/>
+                </a:lnTo>
+                <a:lnTo>
+                  <a:pt x="0" y="0"/>
+                </a:lnTo>
+                <a:close/>
+              </a:path>
+            </a:pathLst>
+          </a:custGeom>
+          <a:blipFill>
+            <a:blip r:embed="rId2">
+              <a:alphaModFix amt="43999"/>
+              <a:extLst>
+                <a:ext uri="{96DAC541-7B7A-43D3-8B79-37D633B846F1}">
+                  <asvg:svgBlip xmlns:asvg="http://schemas.microsoft.com/office/drawing/2016/SVG/main" r:embed="rId3"/>
+                </a:ext>
+              </a:extLst>
+            </a:blip>
+            <a:stretch>
+              <a:fillRect l="0" t="0" r="0" b="0"/>
+            </a:stretch>
+          </a:blipFill>
+        </p:spPr>
+      </p:sp>
+      <p:sp>
+        <p:nvSpPr>
+          <p:cNvPr name="TextBox 4" id="4"/>
+          <p:cNvSpPr txBox="true"/>
+          <p:nvPr/>
+        </p:nvSpPr>
+        <p:spPr>
+          <a:xfrm rot="-592460">
+            <a:off x="4929708" y="2214994"/>
+            <a:ext cx="8343858" cy="2437939"/>
+          </a:xfrm>
+          <a:prstGeom prst="rect">
+            <a:avLst/>
+          </a:prstGeom>
+        </p:spPr>
+        <p:txBody>
+          <a:bodyPr anchor="t" rtlCol="false" tIns="0" lIns="0" bIns="0" rIns="0">
+            <a:spAutoFit/>
+          </a:bodyPr>
+          <a:lstStyle/>
+          <a:p>
+            <a:pPr algn="ctr">
+              <a:lnSpc>
+                <a:spcPts val="18322"/>
+              </a:lnSpc>
+              <a:spcBef>
+                <a:spcPct val="0"/>
+              </a:spcBef>
+            </a:pPr>
+            <a:r>
+              <a:rPr lang="en-US" sz="18322">
+                <a:solidFill>
+                  <a:srgbClr val="05066D"/>
+                </a:solidFill>
+                <a:latin typeface="Bukhari Script Bold"/>
+              </a:rPr>
+              <a:t>Thank</a:t>
+            </a:r>
+          </a:p>
+        </p:txBody>
+      </p:sp>
+      <p:sp>
+        <p:nvSpPr>
+          <p:cNvPr name="TextBox 5" id="5"/>
+          <p:cNvSpPr txBox="true"/>
+          <p:nvPr/>
+        </p:nvSpPr>
+        <p:spPr>
+          <a:xfrm rot="-515361">
+            <a:off x="5829322" y="4407123"/>
+            <a:ext cx="7609456" cy="2196783"/>
+          </a:xfrm>
+          <a:prstGeom prst="rect">
+            <a:avLst/>
+          </a:prstGeom>
+        </p:spPr>
+        <p:txBody>
+          <a:bodyPr anchor="t" rtlCol="false" tIns="0" lIns="0" bIns="0" rIns="0">
+            <a:spAutoFit/>
+          </a:bodyPr>
+          <a:lstStyle/>
+          <a:p>
+            <a:pPr algn="ctr">
+              <a:lnSpc>
+                <a:spcPts val="16490"/>
+              </a:lnSpc>
+              <a:spcBef>
+                <a:spcPct val="0"/>
+              </a:spcBef>
+            </a:pPr>
+            <a:r>
+              <a:rPr lang="en-US" sz="16490">
+                <a:solidFill>
+                  <a:srgbClr val="05066D"/>
+                </a:solidFill>
+                <a:latin typeface="Bukhari Script Bold"/>
+              </a:rPr>
+              <a:t>you!</a:t>
+            </a:r>
+          </a:p>
+        </p:txBody>
+      </p:sp>
+    </p:spTree>
+  </p:cSld>
+  <p:clrMapOvr>
+    <a:masterClrMapping/>
+  </p:clrMapOvr>
+</p:sld>
+</file>
+
+<file path=ppt/slides/slide16.xml><?xml version="1.0" encoding="utf-8"?>
+<p:sld xmlns:p="http://schemas.openxmlformats.org/presentationml/2006/main" xmlns:a="http://schemas.openxmlformats.org/drawingml/2006/main" xmlns:r="http://schemas.openxmlformats.org/officeDocument/2006/relationships">
+  <p:cSld>
+    <p:bg>
+      <p:bgPr>
+        <a:solidFill>
+          <a:srgbClr val="FBFAF8"/>
+        </a:solidFill>
+      </p:bgPr>
+    </p:bg>
+    <p:spTree>
+      <p:nvGrpSpPr>
+        <p:cNvPr id="1" name=""/>
+        <p:cNvGrpSpPr/>
+        <p:nvPr/>
+      </p:nvGrpSpPr>
+      <p:grpSpPr>
+        <a:xfrm>
+          <a:off x="0" y="0"/>
+          <a:ext cx="0" cy="0"/>
+          <a:chOff x="0" y="0"/>
+          <a:chExt cx="0" cy="0"/>
+        </a:xfrm>
+      </p:grpSpPr>
+      <p:sp>
+        <p:nvSpPr>
+          <p:cNvPr name="Freeform 2" id="2"/>
+          <p:cNvSpPr/>
+          <p:nvPr/>
+        </p:nvSpPr>
+        <p:spPr>
+          <a:xfrm flipH="false" flipV="false" rot="0">
+            <a:off x="-1930093" y="7159596"/>
+            <a:ext cx="22473900" cy="7069063"/>
+          </a:xfrm>
+          <a:custGeom>
+            <a:avLst/>
+            <a:gdLst/>
+            <a:ahLst/>
+            <a:cxnLst/>
+            <a:rect r="r" b="b" t="t" l="l"/>
+            <a:pathLst>
+              <a:path h="7069063" w="22473900">
+                <a:moveTo>
+                  <a:pt x="0" y="0"/>
+                </a:moveTo>
+                <a:lnTo>
+                  <a:pt x="22473899" y="0"/>
+                </a:lnTo>
+                <a:lnTo>
+                  <a:pt x="22473899" y="7069063"/>
+                </a:lnTo>
+                <a:lnTo>
+                  <a:pt x="0" y="7069063"/>
+                </a:lnTo>
+                <a:lnTo>
+                  <a:pt x="0" y="0"/>
+                </a:lnTo>
+                <a:close/>
+              </a:path>
+            </a:pathLst>
+          </a:custGeom>
+          <a:blipFill>
+            <a:blip r:embed="rId2">
+              <a:alphaModFix amt="43999"/>
+              <a:extLst>
+                <a:ext uri="{96DAC541-7B7A-43D3-8B79-37D633B846F1}">
+                  <asvg:svgBlip xmlns:asvg="http://schemas.microsoft.com/office/drawing/2016/SVG/main" r:embed="rId3"/>
+                </a:ext>
+              </a:extLst>
+            </a:blip>
+            <a:stretch>
+              <a:fillRect l="0" t="0" r="0" b="0"/>
+            </a:stretch>
+          </a:blipFill>
+        </p:spPr>
+      </p:sp>
+      <p:sp>
+        <p:nvSpPr>
           <p:cNvPr name="TextBox 3" id="3"/>
           <p:cNvSpPr txBox="true"/>
           <p:nvPr/>
@@ -4076,7 +5335,7 @@
                 </a:solidFill>
                 <a:latin typeface="Cocomat Pro Heavy Bold"/>
               </a:rPr>
-              <a:t>ALBERTA VS CANADA</a:t>
+              <a:t>ALBERTA IN CANADA</a:t>
             </a:r>
           </a:p>
         </p:txBody>
@@ -4828,7 +6087,7 @@
         </p:nvSpPr>
         <p:spPr>
           <a:xfrm flipH="false" flipV="false" rot="0">
-            <a:off x="2531132" y="2316226"/>
+            <a:off x="2309001" y="2430526"/>
             <a:ext cx="13225735" cy="11436683"/>
           </a:xfrm>
           <a:custGeom>
@@ -4843,10 +6102,10 @@
                   <a:pt x="0" y="0"/>
                 </a:moveTo>
                 <a:lnTo>
-                  <a:pt x="13225736" y="0"/>
-                </a:lnTo>
-                <a:lnTo>
-                  <a:pt x="13225736" y="11436683"/>
+                  <a:pt x="13225735" y="0"/>
+                </a:lnTo>
+                <a:lnTo>
+                  <a:pt x="13225735" y="11436683"/>
                 </a:lnTo>
                 <a:lnTo>
                   <a:pt x="0" y="11436683"/>
@@ -4874,8 +6133,8 @@
         </p:nvSpPr>
         <p:spPr>
           <a:xfrm flipH="false" flipV="false" rot="0">
-            <a:off x="3631037" y="9301427"/>
-            <a:ext cx="8897158" cy="985573"/>
+            <a:off x="3378091" y="9301427"/>
+            <a:ext cx="9048926" cy="985573"/>
           </a:xfrm>
           <a:custGeom>
             <a:avLst/>
@@ -4884,15 +6143,15 @@
             <a:cxnLst/>
             <a:rect r="r" b="b" t="t" l="l"/>
             <a:pathLst>
-              <a:path h="985573" w="8897158">
+              <a:path h="985573" w="9048926">
                 <a:moveTo>
                   <a:pt x="0" y="0"/>
                 </a:moveTo>
                 <a:lnTo>
-                  <a:pt x="8897159" y="0"/>
-                </a:lnTo>
-                <a:lnTo>
-                  <a:pt x="8897159" y="985573"/>
+                  <a:pt x="9048926" y="0"/>
+                </a:lnTo>
+                <a:lnTo>
+                  <a:pt x="9048926" y="985573"/>
                 </a:lnTo>
                 <a:lnTo>
                   <a:pt x="0" y="985573"/>
@@ -4907,7 +6166,7 @@
           <a:blipFill>
             <a:blip r:embed="rId5"/>
             <a:stretch>
-              <a:fillRect l="0" t="0" r="0" b="0"/>
+              <a:fillRect l="0" t="-852" r="0" b="-852"/>
             </a:stretch>
           </a:blipFill>
         </p:spPr>
@@ -4992,6 +6251,120 @@
                   <a:spcPts val="3418"/>
                 </a:lnSpc>
               </a:pPr>
+            </a:p>
+          </p:txBody>
+        </p:sp>
+      </p:grpSp>
+      <p:grpSp>
+        <p:nvGrpSpPr>
+          <p:cNvPr name="Group 10" id="10"/>
+          <p:cNvGrpSpPr/>
+          <p:nvPr/>
+        </p:nvGrpSpPr>
+        <p:grpSpPr>
+          <a:xfrm rot="0">
+            <a:off x="0" y="9355920"/>
+            <a:ext cx="3544228" cy="653292"/>
+            <a:chOff x="0" y="0"/>
+            <a:chExt cx="780800" cy="143921"/>
+          </a:xfrm>
+        </p:grpSpPr>
+        <p:sp>
+          <p:nvSpPr>
+            <p:cNvPr name="Freeform 11" id="11"/>
+            <p:cNvSpPr/>
+            <p:nvPr/>
+          </p:nvSpPr>
+          <p:spPr>
+            <a:xfrm flipH="false" flipV="false" rot="0">
+              <a:off x="0" y="0"/>
+              <a:ext cx="780800" cy="143921"/>
+            </a:xfrm>
+            <a:custGeom>
+              <a:avLst/>
+              <a:gdLst/>
+              <a:ahLst/>
+              <a:cxnLst/>
+              <a:rect r="r" b="b" t="t" l="l"/>
+              <a:pathLst>
+                <a:path h="143921" w="780800">
+                  <a:moveTo>
+                    <a:pt x="61162" y="0"/>
+                  </a:moveTo>
+                  <a:lnTo>
+                    <a:pt x="719638" y="0"/>
+                  </a:lnTo>
+                  <a:cubicBezTo>
+                    <a:pt x="753417" y="0"/>
+                    <a:pt x="780800" y="27383"/>
+                    <a:pt x="780800" y="61162"/>
+                  </a:cubicBezTo>
+                  <a:lnTo>
+                    <a:pt x="780800" y="82759"/>
+                  </a:lnTo>
+                  <a:cubicBezTo>
+                    <a:pt x="780800" y="116538"/>
+                    <a:pt x="753417" y="143921"/>
+                    <a:pt x="719638" y="143921"/>
+                  </a:cubicBezTo>
+                  <a:lnTo>
+                    <a:pt x="61162" y="143921"/>
+                  </a:lnTo>
+                  <a:cubicBezTo>
+                    <a:pt x="27383" y="143921"/>
+                    <a:pt x="0" y="116538"/>
+                    <a:pt x="0" y="82759"/>
+                  </a:cubicBezTo>
+                  <a:lnTo>
+                    <a:pt x="0" y="61162"/>
+                  </a:lnTo>
+                  <a:cubicBezTo>
+                    <a:pt x="0" y="27383"/>
+                    <a:pt x="27383" y="0"/>
+                    <a:pt x="61162" y="0"/>
+                  </a:cubicBezTo>
+                  <a:close/>
+                </a:path>
+              </a:pathLst>
+            </a:custGeom>
+            <a:solidFill>
+              <a:srgbClr val="2F7CB2"/>
+            </a:solidFill>
+          </p:spPr>
+        </p:sp>
+        <p:sp>
+          <p:nvSpPr>
+            <p:cNvPr name="TextBox 12" id="12"/>
+            <p:cNvSpPr txBox="true"/>
+            <p:nvPr/>
+          </p:nvSpPr>
+          <p:spPr>
+            <a:xfrm>
+              <a:off x="0" y="-38100"/>
+              <a:ext cx="812800" cy="850900"/>
+            </a:xfrm>
+            <a:prstGeom prst="rect">
+              <a:avLst/>
+            </a:prstGeom>
+          </p:spPr>
+          <p:txBody>
+            <a:bodyPr anchor="ctr" rtlCol="false" tIns="0" lIns="0" bIns="0" rIns="0"/>
+            <a:lstStyle/>
+            <a:p>
+              <a:pPr algn="ctr">
+                <a:lnSpc>
+                  <a:spcPts val="3041"/>
+                </a:lnSpc>
+              </a:pPr>
+              <a:r>
+                <a:rPr lang="en-US" sz="2203">
+                  <a:solidFill>
+                    <a:srgbClr val="FFFFFF"/>
+                  </a:solidFill>
+                  <a:latin typeface="Montserrat"/>
+                </a:rPr>
+                <a:t>AVG. INDEX</a:t>
+              </a:r>
             </a:p>
           </p:txBody>
         </p:sp>
@@ -6727,8 +8100,8 @@
         </p:nvSpPr>
         <p:spPr>
           <a:xfrm rot="0">
-            <a:off x="1193043" y="1339999"/>
-            <a:ext cx="11138219" cy="3583579"/>
+            <a:off x="1193043" y="1397149"/>
+            <a:ext cx="11739003" cy="5561966"/>
           </a:xfrm>
           <a:prstGeom prst="rect">
             <a:avLst/>
@@ -6742,36 +8115,36 @@
           <a:p>
             <a:pPr>
               <a:lnSpc>
-                <a:spcPts val="14330"/>
+                <a:spcPts val="11059"/>
               </a:lnSpc>
             </a:pPr>
             <a:r>
-              <a:rPr lang="en-US" sz="10236">
+              <a:rPr lang="en-US" sz="7899">
                 <a:solidFill>
-                  <a:srgbClr val="FFFFFF"/>
+                  <a:srgbClr val="05066D"/>
                 </a:solidFill>
                 <a:latin typeface="Cocomat Pro Heavy Bold"/>
               </a:rPr>
-              <a:t>CONSTRUCTION</a:t>
+              <a:t>HOW DOES OUR ECONOMY</a:t>
             </a:r>
           </a:p>
           <a:p>
             <a:pPr marL="0" indent="0" lvl="0">
               <a:lnSpc>
-                <a:spcPts val="14330"/>
+                <a:spcPts val="11059"/>
               </a:lnSpc>
               <a:spcBef>
                 <a:spcPct val="0"/>
               </a:spcBef>
             </a:pPr>
             <a:r>
-              <a:rPr lang="en-US" sz="10236">
+              <a:rPr lang="en-US" sz="7899">
                 <a:solidFill>
-                  <a:srgbClr val="FFFFFF"/>
+                  <a:srgbClr val="05066D"/>
                 </a:solidFill>
                 <a:latin typeface="Cocomat Pro Heavy Bold"/>
               </a:rPr>
-              <a:t>OVERVIEW</a:t>
+              <a:t>AFFECT CONSTRUCTION?</a:t>
             </a:r>
           </a:p>
         </p:txBody>

</xml_diff>